<commit_message>
version 2 and 3 complete. Added README. minor mod on 2
</commit_message>
<xml_diff>
--- a/presentation/civic_duty_presentation_final_v2.pptx
+++ b/presentation/civic_duty_presentation_final_v2.pptx
@@ -20955,8 +20955,8 @@
         </p:blipFill>
         <p:spPr>
           <a:xfrm>
-            <a:off x="1488278" y="1359875"/>
-            <a:ext cx="8127994" cy="4572002"/>
+            <a:off x="1219200" y="1281160"/>
+            <a:ext cx="10094122" cy="5395767"/>
           </a:xfrm>
           <a:prstGeom prst="rect">
             <a:avLst/>
@@ -25950,6 +25950,22 @@
                                       </p:cBhvr>
                                     </p:animEffect>
                                   </p:childTnLst>
+                                  <p:subTnLst>
+                                    <p:set>
+                                      <p:cBhvr override="childStyle">
+                                        <p:cTn dur="1" fill="hold" display="0" masterRel="nextClick" afterEffect="1"/>
+                                        <p:tgtEl>
+                                          <p:spTgt spid="168"/>
+                                        </p:tgtEl>
+                                        <p:attrNameLst>
+                                          <p:attrName>style.visibility</p:attrName>
+                                        </p:attrNameLst>
+                                      </p:cBhvr>
+                                      <p:to>
+                                        <p:strVal val="hidden"/>
+                                      </p:to>
+                                    </p:set>
+                                  </p:subTnLst>
                                 </p:cTn>
                               </p:par>
                               <p:par>
@@ -25985,6 +26001,22 @@
                                       </p:cBhvr>
                                     </p:animEffect>
                                   </p:childTnLst>
+                                  <p:subTnLst>
+                                    <p:set>
+                                      <p:cBhvr override="childStyle">
+                                        <p:cTn dur="1" fill="hold" display="0" masterRel="nextClick" afterEffect="1"/>
+                                        <p:tgtEl>
+                                          <p:spTgt spid="167"/>
+                                        </p:tgtEl>
+                                        <p:attrNameLst>
+                                          <p:attrName>style.visibility</p:attrName>
+                                        </p:attrNameLst>
+                                      </p:cBhvr>
+                                      <p:to>
+                                        <p:strVal val="hidden"/>
+                                      </p:to>
+                                    </p:set>
+                                  </p:subTnLst>
                                 </p:cTn>
                               </p:par>
                             </p:childTnLst>
@@ -26501,6 +26533,22 @@
                                       </p:cBhvr>
                                     </p:animEffect>
                                   </p:childTnLst>
+                                  <p:subTnLst>
+                                    <p:set>
+                                      <p:cBhvr override="childStyle">
+                                        <p:cTn dur="1" fill="hold" display="0" masterRel="nextClick" afterEffect="1"/>
+                                        <p:tgtEl>
+                                          <p:spTgt spid="178"/>
+                                        </p:tgtEl>
+                                        <p:attrNameLst>
+                                          <p:attrName>style.visibility</p:attrName>
+                                        </p:attrNameLst>
+                                      </p:cBhvr>
+                                      <p:to>
+                                        <p:strVal val="hidden"/>
+                                      </p:to>
+                                    </p:set>
+                                  </p:subTnLst>
                                 </p:cTn>
                               </p:par>
                               <p:par>
@@ -26571,6 +26619,22 @@
                                       </p:cBhvr>
                                     </p:animEffect>
                                   </p:childTnLst>
+                                  <p:subTnLst>
+                                    <p:set>
+                                      <p:cBhvr override="childStyle">
+                                        <p:cTn dur="1" fill="hold" display="0" masterRel="nextClick" afterEffect="1"/>
+                                        <p:tgtEl>
+                                          <p:spTgt spid="179"/>
+                                        </p:tgtEl>
+                                        <p:attrNameLst>
+                                          <p:attrName>style.visibility</p:attrName>
+                                        </p:attrNameLst>
+                                      </p:cBhvr>
+                                      <p:to>
+                                        <p:strVal val="hidden"/>
+                                      </p:to>
+                                    </p:set>
+                                  </p:subTnLst>
                                 </p:cTn>
                               </p:par>
                             </p:childTnLst>

</xml_diff>